<commit_message>
Full Stack con IntegrationTesting
</commit_message>
<xml_diff>
--- a/Diapositivas/2. Mocking.pptx
+++ b/Diapositivas/2. Mocking.pptx
@@ -294,7 +294,7 @@
           <a:p>
             <a:fld id="{63D5FC4C-9EE1-4746-A368-724F618FC790}" type="datetimeFigureOut">
               <a:rPr lang="es-PE" smtClean="0"/>
-              <a:t>26/01/2013</a:t>
+              <a:t>02/02/2013</a:t>
             </a:fld>
             <a:endParaRPr lang="es-PE"/>
           </a:p>
@@ -3044,108 +3044,6 @@
               <a:buFontTx/>
               <a:buNone/>
             </a:pPr>
-            <a:r>
-              <a:rPr lang="es-PE" noProof="0" dirty="0" smtClean="0"/>
-              <a:t>Explicar </a:t>
-            </a:r>
-            <a:r>
-              <a:rPr lang="es-PE" noProof="0" dirty="0" err="1" smtClean="0"/>
-              <a:t>xq</a:t>
-            </a:r>
-            <a:r>
-              <a:rPr lang="es-PE" noProof="0" dirty="0" smtClean="0"/>
-              <a:t> prefiero utilizar interfaces para </a:t>
-            </a:r>
-            <a:r>
-              <a:rPr lang="es-PE" noProof="0" dirty="0" err="1" smtClean="0"/>
-              <a:t>mockear</a:t>
-            </a:r>
-            <a:r>
-              <a:rPr lang="es-PE" noProof="0" dirty="0" smtClean="0"/>
-              <a:t> y no clases</a:t>
-            </a:r>
-            <a:r>
-              <a:rPr lang="es-PE" baseline="0" noProof="0" dirty="0" smtClean="0"/>
-              <a:t> concretas.</a:t>
-            </a:r>
-          </a:p>
-          <a:p>
-            <a:pPr marL="0" indent="0">
-              <a:buFontTx/>
-              <a:buNone/>
-            </a:pPr>
-            <a:endParaRPr lang="es-PE" baseline="0" noProof="0" dirty="0" smtClean="0"/>
-          </a:p>
-          <a:p>
-            <a:pPr marL="171450" indent="-171450">
-              <a:buFontTx/>
-              <a:buChar char="-"/>
-            </a:pPr>
-            <a:r>
-              <a:rPr lang="es-PE" baseline="0" noProof="0" dirty="0" smtClean="0"/>
-              <a:t>Crear solo la firma de test</a:t>
-            </a:r>
-          </a:p>
-          <a:p>
-            <a:pPr marL="171450" indent="-171450">
-              <a:buFontTx/>
-              <a:buChar char="-"/>
-            </a:pPr>
-            <a:r>
-              <a:rPr lang="es-PE" baseline="0" noProof="0" dirty="0" smtClean="0"/>
-              <a:t>Realizar la inyección y la inversión(en java el último paso extraer la interfaz y usar tipo base)</a:t>
-            </a:r>
-          </a:p>
-          <a:p>
-            <a:pPr marL="171450" indent="-171450">
-              <a:buFontTx/>
-              <a:buChar char="-"/>
-            </a:pPr>
-            <a:r>
-              <a:rPr lang="es-PE" baseline="0" noProof="0" dirty="0" smtClean="0"/>
-              <a:t>Terminar el test</a:t>
-            </a:r>
-          </a:p>
-          <a:p>
-            <a:pPr marL="171450" indent="-171450">
-              <a:buFontTx/>
-              <a:buChar char="-"/>
-            </a:pPr>
-            <a:endParaRPr lang="es-PE" baseline="0" noProof="0" dirty="0" smtClean="0"/>
-          </a:p>
-          <a:p>
-            <a:pPr marL="0" indent="0">
-              <a:buFontTx/>
-              <a:buNone/>
-            </a:pPr>
-            <a:r>
-              <a:rPr lang="es-PE" baseline="0" noProof="0" dirty="0" smtClean="0"/>
-              <a:t>En el tercer test darse cuenta que pasa con la mantenibilidad, las herramientas ayudan, pero si lo estuvieras haciendo a mano, tendrías que modificar todos tus </a:t>
-            </a:r>
-            <a:r>
-              <a:rPr lang="es-PE" baseline="0" noProof="0" dirty="0" err="1" smtClean="0"/>
-              <a:t>tests</a:t>
-            </a:r>
-            <a:r>
-              <a:rPr lang="es-PE" baseline="0" noProof="0" dirty="0" smtClean="0"/>
-              <a:t>, y que pasa si esa clase estuviera por toda la </a:t>
-            </a:r>
-            <a:r>
-              <a:rPr lang="es-PE" baseline="0" noProof="0" dirty="0" err="1" smtClean="0"/>
-              <a:t>aplícación</a:t>
-            </a:r>
-            <a:r>
-              <a:rPr lang="es-PE" baseline="0" noProof="0" dirty="0" smtClean="0"/>
-              <a:t>? (hacer el cambio a </a:t>
-            </a:r>
-            <a:r>
-              <a:rPr lang="es-PE" baseline="0" noProof="0" dirty="0" err="1" smtClean="0"/>
-              <a:t>setup</a:t>
-            </a:r>
-            <a:r>
-              <a:rPr lang="es-PE" baseline="0" noProof="0" dirty="0" smtClean="0"/>
-              <a:t> terminando el tercer test pero antes de ejecutarlo)</a:t>
-            </a:r>
             <a:endParaRPr lang="es-PE" noProof="0" dirty="0"/>
           </a:p>
         </p:txBody>
@@ -9395,7 +9293,7 @@
             <a:fld id="{807CB568-C05F-482F-9F26-AA302B8892DF}" type="datetimeFigureOut">
               <a:rPr lang="es-ES" smtClean="0"/>
               <a:pPr/>
-              <a:t>26/01/2013</a:t>
+              <a:t>02/02/2013</a:t>
             </a:fld>
             <a:endParaRPr lang="es-ES"/>
           </a:p>
@@ -9574,7 +9472,7 @@
             <a:fld id="{807CB568-C05F-482F-9F26-AA302B8892DF}" type="datetimeFigureOut">
               <a:rPr lang="es-ES" smtClean="0"/>
               <a:pPr/>
-              <a:t>26/01/2013</a:t>
+              <a:t>02/02/2013</a:t>
             </a:fld>
             <a:endParaRPr lang="es-ES"/>
           </a:p>
@@ -9763,7 +9661,7 @@
             <a:fld id="{807CB568-C05F-482F-9F26-AA302B8892DF}" type="datetimeFigureOut">
               <a:rPr lang="es-ES" smtClean="0"/>
               <a:pPr/>
-              <a:t>26/01/2013</a:t>
+              <a:t>02/02/2013</a:t>
             </a:fld>
             <a:endParaRPr lang="es-ES"/>
           </a:p>
@@ -9942,7 +9840,7 @@
             <a:fld id="{807CB568-C05F-482F-9F26-AA302B8892DF}" type="datetimeFigureOut">
               <a:rPr lang="es-ES" smtClean="0"/>
               <a:pPr/>
-              <a:t>26/01/2013</a:t>
+              <a:t>02/02/2013</a:t>
             </a:fld>
             <a:endParaRPr lang="es-ES"/>
           </a:p>
@@ -10197,7 +10095,7 @@
             <a:fld id="{807CB568-C05F-482F-9F26-AA302B8892DF}" type="datetimeFigureOut">
               <a:rPr lang="es-ES" smtClean="0"/>
               <a:pPr/>
-              <a:t>26/01/2013</a:t>
+              <a:t>02/02/2013</a:t>
             </a:fld>
             <a:endParaRPr lang="es-ES"/>
           </a:p>
@@ -10494,7 +10392,7 @@
             <a:fld id="{807CB568-C05F-482F-9F26-AA302B8892DF}" type="datetimeFigureOut">
               <a:rPr lang="es-ES" smtClean="0"/>
               <a:pPr/>
-              <a:t>26/01/2013</a:t>
+              <a:t>02/02/2013</a:t>
             </a:fld>
             <a:endParaRPr lang="es-ES"/>
           </a:p>
@@ -10925,7 +10823,7 @@
             <a:fld id="{807CB568-C05F-482F-9F26-AA302B8892DF}" type="datetimeFigureOut">
               <a:rPr lang="es-ES" smtClean="0"/>
               <a:pPr/>
-              <a:t>26/01/2013</a:t>
+              <a:t>02/02/2013</a:t>
             </a:fld>
             <a:endParaRPr lang="es-ES"/>
           </a:p>
@@ -11052,7 +10950,7 @@
             <a:fld id="{807CB568-C05F-482F-9F26-AA302B8892DF}" type="datetimeFigureOut">
               <a:rPr lang="es-ES" smtClean="0"/>
               <a:pPr/>
-              <a:t>26/01/2013</a:t>
+              <a:t>02/02/2013</a:t>
             </a:fld>
             <a:endParaRPr lang="es-ES"/>
           </a:p>
@@ -11156,7 +11054,7 @@
             <a:fld id="{807CB568-C05F-482F-9F26-AA302B8892DF}" type="datetimeFigureOut">
               <a:rPr lang="es-ES" smtClean="0"/>
               <a:pPr/>
-              <a:t>26/01/2013</a:t>
+              <a:t>02/02/2013</a:t>
             </a:fld>
             <a:endParaRPr lang="es-ES"/>
           </a:p>
@@ -11442,7 +11340,7 @@
             <a:fld id="{807CB568-C05F-482F-9F26-AA302B8892DF}" type="datetimeFigureOut">
               <a:rPr lang="es-ES" smtClean="0"/>
               <a:pPr/>
-              <a:t>26/01/2013</a:t>
+              <a:t>02/02/2013</a:t>
             </a:fld>
             <a:endParaRPr lang="es-ES"/>
           </a:p>
@@ -11711,7 +11609,7 @@
             <a:fld id="{807CB568-C05F-482F-9F26-AA302B8892DF}" type="datetimeFigureOut">
               <a:rPr lang="es-ES" smtClean="0"/>
               <a:pPr/>
-              <a:t>26/01/2013</a:t>
+              <a:t>02/02/2013</a:t>
             </a:fld>
             <a:endParaRPr lang="es-ES"/>
           </a:p>
@@ -11962,7 +11860,7 @@
             <a:fld id="{807CB568-C05F-482F-9F26-AA302B8892DF}" type="datetimeFigureOut">
               <a:rPr lang="es-ES" smtClean="0"/>
               <a:pPr/>
-              <a:t>26/01/2013</a:t>
+              <a:t>02/02/2013</a:t>
             </a:fld>
             <a:endParaRPr lang="es-ES"/>
           </a:p>
@@ -29063,15 +28961,7 @@
                   <a:srgbClr val="00823B"/>
                 </a:solidFill>
               </a:rPr>
-              <a:t> </a:t>
-            </a:r>
-            <a:r>
-              <a:rPr lang="es-PE" dirty="0" smtClean="0">
-                <a:solidFill>
-                  <a:srgbClr val="00823B"/>
-                </a:solidFill>
-              </a:rPr>
-              <a:t>Evitar Campos y Métodos Estáticos</a:t>
+              <a:t> Evitar Campos y Métodos Estáticos</a:t>
             </a:r>
             <a:endParaRPr lang="es-PE" dirty="0">
               <a:solidFill>

</xml_diff>